<commit_message>
Some changes for GitHub pages
</commit_message>
<xml_diff>
--- a/modules/Mortality/PPT_Total.pptx
+++ b/modules/Mortality/PPT_Total.pptx
@@ -17872,7 +17872,7 @@
 </file>
 
 <file path=ppt/slides/slide11.xml><?xml version="1.0" encoding="utf-8"?>
-<p:sld xmlns:a="http://schemas.openxmlformats.org/drawingml/2006/main" xmlns:r="http://schemas.openxmlformats.org/officeDocument/2006/relationships" xmlns:p="http://schemas.openxmlformats.org/presentationml/2006/main">
+<p:sld xmlns:a="http://schemas.openxmlformats.org/drawingml/2006/main" xmlns:r="http://schemas.openxmlformats.org/officeDocument/2006/relationships" xmlns:p="http://schemas.openxmlformats.org/presentationml/2006/main" show="0">
   <p:cSld>
     <p:spTree>
       <p:nvGrpSpPr>
@@ -18051,6 +18051,14 @@
   <p:clrMapOvr>
     <a:masterClrMapping/>
   </p:clrMapOvr>
+  <mc:AlternateContent xmlns:mc="http://schemas.openxmlformats.org/markup-compatibility/2006">
+    <mc:Choice xmlns:p14="http://schemas.microsoft.com/office/powerpoint/2010/main" Requires="p14">
+      <p:transition spd="slow" p14:dur="2000"/>
+    </mc:Choice>
+    <mc:Fallback>
+      <p:transition spd="slow"/>
+    </mc:Fallback>
+  </mc:AlternateContent>
   <p:timing>
     <p:tnLst>
       <p:par>

</xml_diff>